<commit_message>
Week 3 설명 ppt 수정
</commit_message>
<xml_diff>
--- a/Week 3/Week_3_설명.pptx
+++ b/Week 3/Week_3_설명.pptx
@@ -2933,7 +2933,7 @@
           </a:ln>
           <a:extLst>
             <a:ext uri="{C572A759-6A51-4108-AA02-DFA0A04FC94B}">
-              <ma14:wrappingTextBoxFlag xmlns:ma14="http://schemas.microsoft.com/office/mac/drawingml/2011/main" xmlns:a14="http://schemas.microsoft.com/office/drawing/2010/main" xmlns:m="http://schemas.openxmlformats.org/officeDocument/2006/math" xmlns="" val="1"/>
+              <ma14:wrappingTextBoxFlag xmlns="" xmlns:m="http://schemas.openxmlformats.org/officeDocument/2006/math" xmlns:a14="http://schemas.microsoft.com/office/drawing/2010/main" xmlns:ma14="http://schemas.microsoft.com/office/mac/drawingml/2011/main" val="1"/>
             </a:ext>
           </a:extLst>
         </p:spPr>
@@ -2981,7 +2981,7 @@
           </a:ln>
           <a:extLst>
             <a:ext uri="{C572A759-6A51-4108-AA02-DFA0A04FC94B}">
-              <ma14:wrappingTextBoxFlag xmlns:ma14="http://schemas.microsoft.com/office/mac/drawingml/2011/main" xmlns:a14="http://schemas.microsoft.com/office/drawing/2010/main" xmlns:m="http://schemas.openxmlformats.org/officeDocument/2006/math" xmlns="" val="1"/>
+              <ma14:wrappingTextBoxFlag xmlns="" xmlns:m="http://schemas.openxmlformats.org/officeDocument/2006/math" xmlns:a14="http://schemas.microsoft.com/office/drawing/2010/main" xmlns:ma14="http://schemas.microsoft.com/office/mac/drawingml/2011/main" val="1"/>
             </a:ext>
           </a:extLst>
         </p:spPr>
@@ -5514,7 +5514,7 @@
           </a:ln>
           <a:extLst>
             <a:ext uri="{C572A759-6A51-4108-AA02-DFA0A04FC94B}">
-              <ma14:wrappingTextBoxFlag xmlns:ma14="http://schemas.microsoft.com/office/mac/drawingml/2011/main" xmlns:a14="http://schemas.microsoft.com/office/drawing/2010/main" xmlns:m="http://schemas.openxmlformats.org/officeDocument/2006/math" xmlns="" val="1"/>
+              <ma14:wrappingTextBoxFlag xmlns="" xmlns:m="http://schemas.openxmlformats.org/officeDocument/2006/math" xmlns:a14="http://schemas.microsoft.com/office/drawing/2010/main" xmlns:ma14="http://schemas.microsoft.com/office/mac/drawingml/2011/main" val="1"/>
             </a:ext>
           </a:extLst>
         </p:spPr>
@@ -6503,7 +6503,7 @@
           </a:ln>
           <a:extLst>
             <a:ext uri="{C572A759-6A51-4108-AA02-DFA0A04FC94B}">
-              <ma14:wrappingTextBoxFlag xmlns:ma14="http://schemas.microsoft.com/office/mac/drawingml/2011/main" xmlns:a14="http://schemas.microsoft.com/office/drawing/2010/main" xmlns:m="http://schemas.openxmlformats.org/officeDocument/2006/math" xmlns="" val="1"/>
+              <ma14:wrappingTextBoxFlag xmlns="" xmlns:m="http://schemas.openxmlformats.org/officeDocument/2006/math" xmlns:a14="http://schemas.microsoft.com/office/drawing/2010/main" xmlns:ma14="http://schemas.microsoft.com/office/mac/drawingml/2011/main" val="1"/>
             </a:ext>
           </a:extLst>
         </p:spPr>
@@ -7062,7 +7062,7 @@
           </a:ln>
           <a:extLst>
             <a:ext uri="{C572A759-6A51-4108-AA02-DFA0A04FC94B}">
-              <ma14:wrappingTextBoxFlag xmlns:ma14="http://schemas.microsoft.com/office/mac/drawingml/2011/main" xmlns:a14="http://schemas.microsoft.com/office/drawing/2010/main" xmlns:m="http://schemas.openxmlformats.org/officeDocument/2006/math" xmlns="" val="1"/>
+              <ma14:wrappingTextBoxFlag xmlns="" xmlns:m="http://schemas.openxmlformats.org/officeDocument/2006/math" xmlns:a14="http://schemas.microsoft.com/office/drawing/2010/main" xmlns:ma14="http://schemas.microsoft.com/office/mac/drawingml/2011/main" val="1"/>
             </a:ext>
           </a:extLst>
         </p:spPr>
@@ -8253,7 +8253,7 @@
           </a:ln>
           <a:extLst>
             <a:ext uri="{C572A759-6A51-4108-AA02-DFA0A04FC94B}">
-              <ma14:wrappingTextBoxFlag xmlns:ma14="http://schemas.microsoft.com/office/mac/drawingml/2011/main" xmlns:a14="http://schemas.microsoft.com/office/drawing/2010/main" xmlns:m="http://schemas.openxmlformats.org/officeDocument/2006/math" xmlns="" val="1"/>
+              <ma14:wrappingTextBoxFlag xmlns="" xmlns:m="http://schemas.openxmlformats.org/officeDocument/2006/math" xmlns:a14="http://schemas.microsoft.com/office/drawing/2010/main" xmlns:ma14="http://schemas.microsoft.com/office/mac/drawingml/2011/main" val="1"/>
             </a:ext>
           </a:extLst>
         </p:spPr>
@@ -8869,7 +8869,7 @@
           </a:ln>
           <a:extLst>
             <a:ext uri="{C572A759-6A51-4108-AA02-DFA0A04FC94B}">
-              <ma14:wrappingTextBoxFlag xmlns:ma14="http://schemas.microsoft.com/office/mac/drawingml/2011/main" xmlns:a14="http://schemas.microsoft.com/office/drawing/2010/main" xmlns:m="http://schemas.openxmlformats.org/officeDocument/2006/math" xmlns="" val="1"/>
+              <ma14:wrappingTextBoxFlag xmlns="" xmlns:m="http://schemas.openxmlformats.org/officeDocument/2006/math" xmlns:a14="http://schemas.microsoft.com/office/drawing/2010/main" xmlns:ma14="http://schemas.microsoft.com/office/mac/drawingml/2011/main" val="1"/>
             </a:ext>
           </a:extLst>
         </p:spPr>
@@ -9325,7 +9325,7 @@
           </a:ln>
           <a:extLst>
             <a:ext uri="{C572A759-6A51-4108-AA02-DFA0A04FC94B}">
-              <ma14:wrappingTextBoxFlag xmlns:ma14="http://schemas.microsoft.com/office/mac/drawingml/2011/main" xmlns:a14="http://schemas.microsoft.com/office/drawing/2010/main" xmlns:m="http://schemas.openxmlformats.org/officeDocument/2006/math" xmlns="" val="1"/>
+              <ma14:wrappingTextBoxFlag xmlns="" xmlns:m="http://schemas.openxmlformats.org/officeDocument/2006/math" xmlns:a14="http://schemas.microsoft.com/office/drawing/2010/main" xmlns:ma14="http://schemas.microsoft.com/office/mac/drawingml/2011/main" val="1"/>
             </a:ext>
           </a:extLst>
         </p:spPr>
@@ -10066,7 +10066,7 @@
           </a:ln>
           <a:extLst>
             <a:ext uri="{C572A759-6A51-4108-AA02-DFA0A04FC94B}">
-              <ma14:wrappingTextBoxFlag xmlns:ma14="http://schemas.microsoft.com/office/mac/drawingml/2011/main" xmlns:a14="http://schemas.microsoft.com/office/drawing/2010/main" xmlns:m="http://schemas.openxmlformats.org/officeDocument/2006/math" xmlns="" val="1"/>
+              <ma14:wrappingTextBoxFlag xmlns="" xmlns:m="http://schemas.openxmlformats.org/officeDocument/2006/math" xmlns:a14="http://schemas.microsoft.com/office/drawing/2010/main" xmlns:ma14="http://schemas.microsoft.com/office/mac/drawingml/2011/main" val="1"/>
             </a:ext>
           </a:extLst>
         </p:spPr>
@@ -10724,7 +10724,7 @@
           </a:ln>
           <a:extLst>
             <a:ext uri="{C572A759-6A51-4108-AA02-DFA0A04FC94B}">
-              <ma14:wrappingTextBoxFlag xmlns:ma14="http://schemas.microsoft.com/office/mac/drawingml/2011/main" xmlns:a14="http://schemas.microsoft.com/office/drawing/2010/main" xmlns:m="http://schemas.openxmlformats.org/officeDocument/2006/math" xmlns="" val="1"/>
+              <ma14:wrappingTextBoxFlag xmlns="" xmlns:m="http://schemas.openxmlformats.org/officeDocument/2006/math" xmlns:a14="http://schemas.microsoft.com/office/drawing/2010/main" xmlns:ma14="http://schemas.microsoft.com/office/mac/drawingml/2011/main" val="1"/>
             </a:ext>
           </a:extLst>
         </p:spPr>
@@ -11418,7 +11418,7 @@
           </a:ln>
           <a:extLst>
             <a:ext uri="{C572A759-6A51-4108-AA02-DFA0A04FC94B}">
-              <ma14:wrappingTextBoxFlag xmlns:ma14="http://schemas.microsoft.com/office/mac/drawingml/2011/main" xmlns:a14="http://schemas.microsoft.com/office/drawing/2010/main" xmlns:m="http://schemas.openxmlformats.org/officeDocument/2006/math" xmlns="" val="1"/>
+              <ma14:wrappingTextBoxFlag xmlns="" xmlns:m="http://schemas.openxmlformats.org/officeDocument/2006/math" xmlns:a14="http://schemas.microsoft.com/office/drawing/2010/main" xmlns:ma14="http://schemas.microsoft.com/office/mac/drawingml/2011/main" val="1"/>
             </a:ext>
           </a:extLst>
         </p:spPr>
@@ -13116,7 +13116,7 @@
           </a:ln>
           <a:extLst>
             <a:ext uri="{C572A759-6A51-4108-AA02-DFA0A04FC94B}">
-              <ma14:wrappingTextBoxFlag xmlns:ma14="http://schemas.microsoft.com/office/mac/drawingml/2011/main" xmlns:a14="http://schemas.microsoft.com/office/drawing/2010/main" xmlns:m="http://schemas.openxmlformats.org/officeDocument/2006/math" xmlns="" val="1"/>
+              <ma14:wrappingTextBoxFlag xmlns="" xmlns:m="http://schemas.openxmlformats.org/officeDocument/2006/math" xmlns:a14="http://schemas.microsoft.com/office/drawing/2010/main" xmlns:ma14="http://schemas.microsoft.com/office/mac/drawingml/2011/main" val="1"/>
             </a:ext>
           </a:extLst>
         </p:spPr>
@@ -13842,7 +13842,7 @@
           </a:ln>
           <a:extLst>
             <a:ext uri="{C572A759-6A51-4108-AA02-DFA0A04FC94B}">
-              <ma14:wrappingTextBoxFlag xmlns:ma14="http://schemas.microsoft.com/office/mac/drawingml/2011/main" xmlns:a14="http://schemas.microsoft.com/office/drawing/2010/main" xmlns:m="http://schemas.openxmlformats.org/officeDocument/2006/math" xmlns="" val="1"/>
+              <ma14:wrappingTextBoxFlag xmlns="" xmlns:m="http://schemas.openxmlformats.org/officeDocument/2006/math" xmlns:a14="http://schemas.microsoft.com/office/drawing/2010/main" xmlns:ma14="http://schemas.microsoft.com/office/mac/drawingml/2011/main" val="1"/>
             </a:ext>
           </a:extLst>
         </p:spPr>
@@ -14514,7 +14514,7 @@
           </a:ln>
           <a:extLst>
             <a:ext uri="{C572A759-6A51-4108-AA02-DFA0A04FC94B}">
-              <ma14:wrappingTextBoxFlag xmlns:ma14="http://schemas.microsoft.com/office/mac/drawingml/2011/main" xmlns:a14="http://schemas.microsoft.com/office/drawing/2010/main" xmlns:m="http://schemas.openxmlformats.org/officeDocument/2006/math" xmlns="" val="1"/>
+              <ma14:wrappingTextBoxFlag xmlns="" xmlns:m="http://schemas.openxmlformats.org/officeDocument/2006/math" xmlns:a14="http://schemas.microsoft.com/office/drawing/2010/main" xmlns:ma14="http://schemas.microsoft.com/office/mac/drawingml/2011/main" val="1"/>
             </a:ext>
           </a:extLst>
         </p:spPr>
@@ -15747,7 +15747,7 @@
           </a:ln>
           <a:extLst>
             <a:ext uri="{C572A759-6A51-4108-AA02-DFA0A04FC94B}">
-              <ma14:wrappingTextBoxFlag xmlns:ma14="http://schemas.microsoft.com/office/mac/drawingml/2011/main" xmlns:a14="http://schemas.microsoft.com/office/drawing/2010/main" xmlns:m="http://schemas.openxmlformats.org/officeDocument/2006/math" xmlns="" val="1"/>
+              <ma14:wrappingTextBoxFlag xmlns="" xmlns:m="http://schemas.openxmlformats.org/officeDocument/2006/math" xmlns:a14="http://schemas.microsoft.com/office/drawing/2010/main" xmlns:ma14="http://schemas.microsoft.com/office/mac/drawingml/2011/main" val="1"/>
             </a:ext>
           </a:extLst>
         </p:spPr>
@@ -16222,7 +16222,57 @@
                 <a:latin typeface="KBIZ한마음고딕 B" panose="02020503020101020101" pitchFamily="18" charset="-127"/>
                 <a:ea typeface="KBIZ한마음고딕 B" panose="02020503020101020101" pitchFamily="18" charset="-127"/>
               </a:rPr>
-              <a:t>이중 연결 리스트 </a:t>
+              <a:t>이중 연결 </a:t>
+            </a:r>
+            <a:r>
+              <a:rPr lang="ko-KR" altLang="en-US" sz="3200" b="1">
+                <a:solidFill>
+                  <a:srgbClr val="0070C0"/>
+                </a:solidFill>
+                <a:latin typeface="KBIZ한마음고딕 B" panose="02020503020101020101" pitchFamily="18" charset="-127"/>
+                <a:ea typeface="KBIZ한마음고딕 B" panose="02020503020101020101" pitchFamily="18" charset="-127"/>
+              </a:rPr>
+              <a:t>리스트</a:t>
+            </a:r>
+            <a:r>
+              <a:rPr lang="en-US" altLang="ko-KR" sz="3200" b="1">
+                <a:solidFill>
+                  <a:srgbClr val="0070C0"/>
+                </a:solidFill>
+                <a:latin typeface="KBIZ한마음고딕 B" panose="02020503020101020101" pitchFamily="18" charset="-127"/>
+                <a:ea typeface="KBIZ한마음고딕 B" panose="02020503020101020101" pitchFamily="18" charset="-127"/>
+              </a:rPr>
+              <a:t>(</a:t>
+            </a:r>
+            <a:r>
+              <a:rPr lang="ko-KR" altLang="en-US" sz="3200" b="1">
+                <a:solidFill>
+                  <a:srgbClr val="0070C0"/>
+                </a:solidFill>
+                <a:latin typeface="KBIZ한마음고딕 B" panose="02020503020101020101" pitchFamily="18" charset="-127"/>
+                <a:ea typeface="KBIZ한마음고딕 B" panose="02020503020101020101" pitchFamily="18" charset="-127"/>
+              </a:rPr>
+              <a:t>도전 문제</a:t>
+            </a:r>
+            <a:r>
+              <a:rPr lang="en-US" altLang="ko-KR" sz="3200" b="1">
+                <a:solidFill>
+                  <a:srgbClr val="0070C0"/>
+                </a:solidFill>
+                <a:latin typeface="KBIZ한마음고딕 B" panose="02020503020101020101" pitchFamily="18" charset="-127"/>
+                <a:ea typeface="KBIZ한마음고딕 B" panose="02020503020101020101" pitchFamily="18" charset="-127"/>
+              </a:rPr>
+              <a:t>)</a:t>
+            </a:r>
+            <a:r>
+              <a:rPr lang="ko-KR" altLang="en-US" sz="3200" b="1">
+                <a:solidFill>
+                  <a:srgbClr val="0070C0"/>
+                </a:solidFill>
+                <a:latin typeface="KBIZ한마음고딕 B" panose="02020503020101020101" pitchFamily="18" charset="-127"/>
+                <a:ea typeface="KBIZ한마음고딕 B" panose="02020503020101020101" pitchFamily="18" charset="-127"/>
+              </a:rPr>
+              <a:t> </a:t>
             </a:r>
             <a:r>
               <a:rPr lang="en-US" altLang="ko-KR" sz="3200" b="1" dirty="0">

</xml_diff>